<commit_message>
Tables and graphs for correction.Rmd.
</commit_message>
<xml_diff>
--- a/r/correction.pptx
+++ b/r/correction.pptx
@@ -12,6 +12,10 @@
     <p:sldId id="260" r:id="rId6"/>
     <p:sldId id="261" r:id="rId7"/>
     <p:sldId id="262" r:id="rId8"/>
+    <p:sldId id="263" r:id="rId9"/>
+    <p:sldId id="264" r:id="rId10"/>
+    <p:sldId id="265" r:id="rId11"/>
+    <p:sldId id="266" r:id="rId12"/>
   </p:sldIdLst>
   <p:sldSz cx="9144000" cy="6858000" type="screen4x3"/>
   <p:notesSz cx="6858000" cy="9144000"/>
@@ -3224,6 +3228,380 @@
 </p:sld>
 </file>
 
+<file path=ppt/slides/slide10.xml><?xml version="1.0" encoding="utf-8"?>
+<p:sld xmlns:a="http://schemas.openxmlformats.org/drawingml/2006/main" xmlns:r="http://schemas.openxmlformats.org/officeDocument/2006/relationships" xmlns:p="http://schemas.openxmlformats.org/presentationml/2006/main">
+  <p:cSld>
+    <p:spTree>
+      <p:nvGrpSpPr>
+        <p:cNvPr id="1" name=""/>
+        <p:cNvGrpSpPr/>
+        <p:nvPr/>
+      </p:nvGrpSpPr>
+      <p:grpSpPr>
+        <a:xfrm>
+          <a:off x="0" y="0"/>
+          <a:ext cx="0" cy="0"/>
+          <a:chOff x="0" y="0"/>
+          <a:chExt cx="0" cy="0"/>
+        </a:xfrm>
+      </p:grpSpPr>
+      <p:sp>
+        <p:nvSpPr>
+          <p:cNvPr id="2" name="Title 1"/>
+          <p:cNvSpPr>
+            <a:spLocks noGrp="1"/>
+          </p:cNvSpPr>
+          <p:nvPr>
+            <p:ph type="title"/>
+          </p:nvPr>
+        </p:nvSpPr>
+        <p:spPr/>
+        <p:txBody>
+          <a:bodyPr/>
+          <a:lstStyle/>
+          <a:p>
+            <a:pPr lvl="0" marL="0" indent="0">
+              <a:buNone/>
+            </a:pPr>
+            <a:r>
+              <a:rPr/>
+              <a:t>SAS</a:t>
+            </a:r>
+            <a:r>
+              <a:rPr/>
+              <a:t> </a:t>
+            </a:r>
+            <a:r>
+              <a:rPr/>
+              <a:t>graph</a:t>
+            </a:r>
+            <a:r>
+              <a:rPr/>
+              <a:t> </a:t>
+            </a:r>
+            <a:r>
+              <a:rPr/>
+              <a:t>of</a:t>
+            </a:r>
+            <a:r>
+              <a:rPr/>
+              <a:t> </a:t>
+            </a:r>
+            <a:r>
+              <a:rPr/>
+              <a:t>Weibull</a:t>
+            </a:r>
+            <a:r>
+              <a:rPr/>
+              <a:t> </a:t>
+            </a:r>
+            <a:r>
+              <a:rPr/>
+              <a:t>survival</a:t>
+            </a:r>
+          </a:p>
+        </p:txBody>
+      </p:sp>
+      <p:pic>
+        <p:nvPicPr>
+          <p:cNvPr descr="../images/weibull_graph_sas.png" id="0" name="Picture 1"/>
+          <p:cNvPicPr>
+            <a:picLocks noGrp="1" noChangeAspect="1"/>
+          </p:cNvPicPr>
+          <p:nvPr/>
+        </p:nvPicPr>
+        <p:blipFill>
+          <a:blip r:embed="rId2"/>
+          <a:stretch>
+            <a:fillRect/>
+          </a:stretch>
+        </p:blipFill>
+        <p:spPr bwMode="auto">
+          <a:xfrm>
+            <a:off x="1879600" y="1600200"/>
+            <a:ext cx="5384800" cy="4013200"/>
+          </a:xfrm>
+          <a:prstGeom prst="rect">
+            <a:avLst/>
+          </a:prstGeom>
+          <a:noFill/>
+          <a:ln w="9525">
+            <a:noFill/>
+            <a:headEnd/>
+            <a:tailEnd/>
+          </a:ln>
+        </p:spPr>
+      </p:pic>
+      <p:sp>
+        <p:nvSpPr>
+          <p:cNvPr id="1" name="TextBox 3"/>
+          <p:cNvSpPr txBox="1"/>
+          <p:nvPr/>
+        </p:nvSpPr>
+        <p:spPr>
+          <a:xfrm>
+            <a:off x="457200" y="5613400"/>
+            <a:ext cx="8229600" cy="508000"/>
+          </a:xfrm>
+          <a:prstGeom prst="rect">
+            <a:avLst/>
+          </a:prstGeom>
+          <a:noFill/>
+        </p:spPr>
+        <p:txBody>
+          <a:bodyPr/>
+          <a:lstStyle/>
+          <a:p>
+            <a:pPr lvl="0" marL="0" indent="0" algn="ctr">
+              <a:buNone/>
+            </a:pPr>
+            <a:r>
+              <a:rPr/>
+              <a:t>Graph</a:t>
+            </a:r>
+            <a:r>
+              <a:rPr/>
+              <a:t> </a:t>
+            </a:r>
+            <a:r>
+              <a:rPr/>
+              <a:t>of</a:t>
+            </a:r>
+            <a:r>
+              <a:rPr/>
+              <a:t> </a:t>
+            </a:r>
+            <a:r>
+              <a:rPr/>
+              <a:t>survival</a:t>
+            </a:r>
+            <a:r>
+              <a:rPr/>
+              <a:t> </a:t>
+            </a:r>
+            <a:r>
+              <a:rPr/>
+              <a:t>curves</a:t>
+            </a:r>
+            <a:r>
+              <a:rPr/>
+              <a:t> </a:t>
+            </a:r>
+            <a:r>
+              <a:rPr/>
+              <a:t>showing</a:t>
+            </a:r>
+            <a:r>
+              <a:rPr/>
+              <a:t> </a:t>
+            </a:r>
+            <a:r>
+              <a:rPr/>
+              <a:t>a</a:t>
+            </a:r>
+            <a:r>
+              <a:rPr/>
+              <a:t> </a:t>
+            </a:r>
+            <a:r>
+              <a:rPr/>
+              <a:t>decreasing</a:t>
+            </a:r>
+            <a:r>
+              <a:rPr/>
+              <a:t> </a:t>
+            </a:r>
+            <a:r>
+              <a:rPr/>
+              <a:t>hazard</a:t>
+            </a:r>
+            <a:r>
+              <a:rPr/>
+              <a:t> </a:t>
+            </a:r>
+            <a:r>
+              <a:rPr/>
+              <a:t>rate</a:t>
+            </a:r>
+          </a:p>
+        </p:txBody>
+      </p:sp>
+    </p:spTree>
+  </p:cSld>
+</p:sld>
+</file>
+
+<file path=ppt/slides/slide11.xml><?xml version="1.0" encoding="utf-8"?>
+<p:sld xmlns:a="http://schemas.openxmlformats.org/drawingml/2006/main" xmlns:r="http://schemas.openxmlformats.org/officeDocument/2006/relationships" xmlns:p="http://schemas.openxmlformats.org/presentationml/2006/main">
+  <p:cSld>
+    <p:spTree>
+      <p:nvGrpSpPr>
+        <p:cNvPr id="1" name=""/>
+        <p:cNvGrpSpPr/>
+        <p:nvPr/>
+      </p:nvGrpSpPr>
+      <p:grpSpPr>
+        <a:xfrm>
+          <a:off x="0" y="0"/>
+          <a:ext cx="0" cy="0"/>
+          <a:chOff x="0" y="0"/>
+          <a:chExt cx="0" cy="0"/>
+        </a:xfrm>
+      </p:grpSpPr>
+      <p:sp>
+        <p:nvSpPr>
+          <p:cNvPr id="2" name="Title 1"/>
+          <p:cNvSpPr>
+            <a:spLocks noGrp="1"/>
+          </p:cNvSpPr>
+          <p:nvPr>
+            <p:ph type="title"/>
+          </p:nvPr>
+        </p:nvSpPr>
+        <p:spPr/>
+        <p:txBody>
+          <a:bodyPr/>
+          <a:lstStyle/>
+          <a:p>
+            <a:pPr lvl="0" marL="0" indent="0">
+              <a:buNone/>
+            </a:pPr>
+            <a:r>
+              <a:rPr/>
+              <a:t>SAS</a:t>
+            </a:r>
+            <a:r>
+              <a:rPr/>
+              <a:t> </a:t>
+            </a:r>
+            <a:r>
+              <a:rPr/>
+              <a:t>table</a:t>
+            </a:r>
+            <a:r>
+              <a:rPr/>
+              <a:t> </a:t>
+            </a:r>
+            <a:r>
+              <a:rPr/>
+              <a:t>of</a:t>
+            </a:r>
+            <a:r>
+              <a:rPr/>
+              <a:t> </a:t>
+            </a:r>
+            <a:r>
+              <a:rPr/>
+              <a:t>Weibull</a:t>
+            </a:r>
+            <a:r>
+              <a:rPr/>
+              <a:t> </a:t>
+            </a:r>
+            <a:r>
+              <a:rPr/>
+              <a:t>fit</a:t>
+            </a:r>
+          </a:p>
+        </p:txBody>
+      </p:sp>
+      <p:pic>
+        <p:nvPicPr>
+          <p:cNvPr descr="../images/weibull_table_sas.png" id="0" name="Picture 1"/>
+          <p:cNvPicPr>
+            <a:picLocks noGrp="1" noChangeAspect="1"/>
+          </p:cNvPicPr>
+          <p:nvPr/>
+        </p:nvPicPr>
+        <p:blipFill>
+          <a:blip r:embed="rId2"/>
+          <a:stretch>
+            <a:fillRect/>
+          </a:stretch>
+        </p:blipFill>
+        <p:spPr bwMode="auto">
+          <a:xfrm>
+            <a:off x="457200" y="1727200"/>
+            <a:ext cx="8229600" cy="3759200"/>
+          </a:xfrm>
+          <a:prstGeom prst="rect">
+            <a:avLst/>
+          </a:prstGeom>
+          <a:noFill/>
+          <a:ln w="9525">
+            <a:noFill/>
+            <a:headEnd/>
+            <a:tailEnd/>
+          </a:ln>
+        </p:spPr>
+      </p:pic>
+      <p:sp>
+        <p:nvSpPr>
+          <p:cNvPr id="1" name="TextBox 3"/>
+          <p:cNvSpPr txBox="1"/>
+          <p:nvPr/>
+        </p:nvSpPr>
+        <p:spPr>
+          <a:xfrm>
+            <a:off x="457200" y="5613400"/>
+            <a:ext cx="8229600" cy="508000"/>
+          </a:xfrm>
+          <a:prstGeom prst="rect">
+            <a:avLst/>
+          </a:prstGeom>
+          <a:noFill/>
+        </p:spPr>
+        <p:txBody>
+          <a:bodyPr/>
+          <a:lstStyle/>
+          <a:p>
+            <a:pPr lvl="0" marL="0" indent="0" algn="ctr">
+              <a:buNone/>
+            </a:pPr>
+            <a:r>
+              <a:rPr/>
+              <a:t>Table</a:t>
+            </a:r>
+            <a:r>
+              <a:rPr/>
+              <a:t> </a:t>
+            </a:r>
+            <a:r>
+              <a:rPr/>
+              <a:t>of</a:t>
+            </a:r>
+            <a:r>
+              <a:rPr/>
+              <a:t> </a:t>
+            </a:r>
+            <a:r>
+              <a:rPr/>
+              <a:t>Weibull</a:t>
+            </a:r>
+            <a:r>
+              <a:rPr/>
+              <a:t> </a:t>
+            </a:r>
+            <a:r>
+              <a:rPr/>
+              <a:t>model</a:t>
+            </a:r>
+            <a:r>
+              <a:rPr/>
+              <a:t> </a:t>
+            </a:r>
+            <a:r>
+              <a:rPr/>
+              <a:t>fit</a:t>
+            </a:r>
+          </a:p>
+        </p:txBody>
+      </p:sp>
+    </p:spTree>
+  </p:cSld>
+</p:sld>
+</file>
+
 <file path=ppt/slides/slide2.xml><?xml version="1.0" encoding="utf-8"?>
 <p:sld xmlns:a="http://schemas.openxmlformats.org/drawingml/2006/main" xmlns:r="http://schemas.openxmlformats.org/officeDocument/2006/relationships" xmlns:p="http://schemas.openxmlformats.org/presentationml/2006/main">
   <p:cSld>
@@ -3676,15 +4054,7 @@
             </a:r>
             <a:r>
               <a:rPr/>
-              <a:t>represents</a:t>
-            </a:r>
-            <a:r>
-              <a:rPr/>
-              <a:t> </a:t>
-            </a:r>
-            <a:r>
-              <a:rPr/>
-              <a:t>a</a:t>
+              <a:t>is</a:t>
             </a:r>
             <a:r>
               <a:rPr/>
@@ -3708,31 +4078,7 @@
             </a:r>
             <a:r>
               <a:rPr/>
-              <a:t>an</a:t>
-            </a:r>
-            <a:r>
-              <a:rPr/>
-              <a:t> </a:t>
-            </a:r>
-            <a:r>
-              <a:rPr/>
-              <a:t>increasing</a:t>
-            </a:r>
-            <a:r>
-              <a:rPr/>
-              <a:t> </a:t>
-            </a:r>
-            <a:r>
-              <a:rPr/>
-              <a:t>hazard</a:t>
-            </a:r>
-            <a:r>
-              <a:rPr/>
-              <a:t> </a:t>
-            </a:r>
-            <a:r>
-              <a:rPr/>
-              <a:t>rate</a:t>
+              <a:t>k=2</a:t>
             </a:r>
           </a:p>
         </p:txBody>
@@ -3825,15 +4171,7 @@
             </a:r>
             <a:r>
               <a:rPr/>
-              <a:t>represents</a:t>
-            </a:r>
-            <a:r>
-              <a:rPr/>
-              <a:t> </a:t>
-            </a:r>
-            <a:r>
-              <a:rPr/>
-              <a:t>a</a:t>
+              <a:t>is</a:t>
             </a:r>
             <a:r>
               <a:rPr/>
@@ -3857,31 +4195,7 @@
             </a:r>
             <a:r>
               <a:rPr/>
-              <a:t>an</a:t>
-            </a:r>
-            <a:r>
-              <a:rPr/>
-              <a:t> </a:t>
-            </a:r>
-            <a:r>
-              <a:rPr/>
-              <a:t>decreasing</a:t>
-            </a:r>
-            <a:r>
-              <a:rPr/>
-              <a:t> </a:t>
-            </a:r>
-            <a:r>
-              <a:rPr/>
-              <a:t>hazard</a:t>
-            </a:r>
-            <a:r>
-              <a:rPr/>
-              <a:t> </a:t>
-            </a:r>
-            <a:r>
-              <a:rPr/>
-              <a:t>rate</a:t>
+              <a:t>k=0.5</a:t>
             </a:r>
           </a:p>
         </p:txBody>
@@ -4401,6 +4715,380 @@
           </p:sp>
         </mc:Choice>
       </mc:AlternateContent>
+    </p:spTree>
+  </p:cSld>
+</p:sld>
+</file>
+
+<file path=ppt/slides/slide8.xml><?xml version="1.0" encoding="utf-8"?>
+<p:sld xmlns:a="http://schemas.openxmlformats.org/drawingml/2006/main" xmlns:r="http://schemas.openxmlformats.org/officeDocument/2006/relationships" xmlns:p="http://schemas.openxmlformats.org/presentationml/2006/main">
+  <p:cSld>
+    <p:spTree>
+      <p:nvGrpSpPr>
+        <p:cNvPr id="1" name=""/>
+        <p:cNvGrpSpPr/>
+        <p:nvPr/>
+      </p:nvGrpSpPr>
+      <p:grpSpPr>
+        <a:xfrm>
+          <a:off x="0" y="0"/>
+          <a:ext cx="0" cy="0"/>
+          <a:chOff x="0" y="0"/>
+          <a:chExt cx="0" cy="0"/>
+        </a:xfrm>
+      </p:grpSpPr>
+      <p:sp>
+        <p:nvSpPr>
+          <p:cNvPr id="2" name="Title 1"/>
+          <p:cNvSpPr>
+            <a:spLocks noGrp="1"/>
+          </p:cNvSpPr>
+          <p:nvPr>
+            <p:ph type="title"/>
+          </p:nvPr>
+        </p:nvSpPr>
+        <p:spPr/>
+        <p:txBody>
+          <a:bodyPr/>
+          <a:lstStyle/>
+          <a:p>
+            <a:pPr lvl="0" marL="0" indent="0">
+              <a:buNone/>
+            </a:pPr>
+            <a:r>
+              <a:rPr/>
+              <a:t>R</a:t>
+            </a:r>
+            <a:r>
+              <a:rPr/>
+              <a:t> </a:t>
+            </a:r>
+            <a:r>
+              <a:rPr/>
+              <a:t>graph</a:t>
+            </a:r>
+            <a:r>
+              <a:rPr/>
+              <a:t> </a:t>
+            </a:r>
+            <a:r>
+              <a:rPr/>
+              <a:t>of</a:t>
+            </a:r>
+            <a:r>
+              <a:rPr/>
+              <a:t> </a:t>
+            </a:r>
+            <a:r>
+              <a:rPr/>
+              <a:t>Weibull</a:t>
+            </a:r>
+            <a:r>
+              <a:rPr/>
+              <a:t> </a:t>
+            </a:r>
+            <a:r>
+              <a:rPr/>
+              <a:t>survival</a:t>
+            </a:r>
+          </a:p>
+        </p:txBody>
+      </p:sp>
+      <p:pic>
+        <p:nvPicPr>
+          <p:cNvPr descr="../images/weibull_graph_r.png" id="0" name="Picture 1"/>
+          <p:cNvPicPr>
+            <a:picLocks noGrp="1" noChangeAspect="1"/>
+          </p:cNvPicPr>
+          <p:nvPr/>
+        </p:nvPicPr>
+        <p:blipFill>
+          <a:blip r:embed="rId2"/>
+          <a:stretch>
+            <a:fillRect/>
+          </a:stretch>
+        </p:blipFill>
+        <p:spPr bwMode="auto">
+          <a:xfrm>
+            <a:off x="990600" y="1600200"/>
+            <a:ext cx="7150100" cy="4013200"/>
+          </a:xfrm>
+          <a:prstGeom prst="rect">
+            <a:avLst/>
+          </a:prstGeom>
+          <a:noFill/>
+          <a:ln w="9525">
+            <a:noFill/>
+            <a:headEnd/>
+            <a:tailEnd/>
+          </a:ln>
+        </p:spPr>
+      </p:pic>
+      <p:sp>
+        <p:nvSpPr>
+          <p:cNvPr id="1" name="TextBox 3"/>
+          <p:cNvSpPr txBox="1"/>
+          <p:nvPr/>
+        </p:nvSpPr>
+        <p:spPr>
+          <a:xfrm>
+            <a:off x="457200" y="5613400"/>
+            <a:ext cx="8229600" cy="508000"/>
+          </a:xfrm>
+          <a:prstGeom prst="rect">
+            <a:avLst/>
+          </a:prstGeom>
+          <a:noFill/>
+        </p:spPr>
+        <p:txBody>
+          <a:bodyPr/>
+          <a:lstStyle/>
+          <a:p>
+            <a:pPr lvl="0" marL="0" indent="0" algn="ctr">
+              <a:buNone/>
+            </a:pPr>
+            <a:r>
+              <a:rPr/>
+              <a:t>Graph</a:t>
+            </a:r>
+            <a:r>
+              <a:rPr/>
+              <a:t> </a:t>
+            </a:r>
+            <a:r>
+              <a:rPr/>
+              <a:t>of</a:t>
+            </a:r>
+            <a:r>
+              <a:rPr/>
+              <a:t> </a:t>
+            </a:r>
+            <a:r>
+              <a:rPr/>
+              <a:t>survival</a:t>
+            </a:r>
+            <a:r>
+              <a:rPr/>
+              <a:t> </a:t>
+            </a:r>
+            <a:r>
+              <a:rPr/>
+              <a:t>curves</a:t>
+            </a:r>
+            <a:r>
+              <a:rPr/>
+              <a:t> </a:t>
+            </a:r>
+            <a:r>
+              <a:rPr/>
+              <a:t>showing</a:t>
+            </a:r>
+            <a:r>
+              <a:rPr/>
+              <a:t> </a:t>
+            </a:r>
+            <a:r>
+              <a:rPr/>
+              <a:t>a</a:t>
+            </a:r>
+            <a:r>
+              <a:rPr/>
+              <a:t> </a:t>
+            </a:r>
+            <a:r>
+              <a:rPr/>
+              <a:t>decreasing</a:t>
+            </a:r>
+            <a:r>
+              <a:rPr/>
+              <a:t> </a:t>
+            </a:r>
+            <a:r>
+              <a:rPr/>
+              <a:t>hazard</a:t>
+            </a:r>
+            <a:r>
+              <a:rPr/>
+              <a:t> </a:t>
+            </a:r>
+            <a:r>
+              <a:rPr/>
+              <a:t>rate</a:t>
+            </a:r>
+          </a:p>
+        </p:txBody>
+      </p:sp>
+    </p:spTree>
+  </p:cSld>
+</p:sld>
+</file>
+
+<file path=ppt/slides/slide9.xml><?xml version="1.0" encoding="utf-8"?>
+<p:sld xmlns:a="http://schemas.openxmlformats.org/drawingml/2006/main" xmlns:r="http://schemas.openxmlformats.org/officeDocument/2006/relationships" xmlns:p="http://schemas.openxmlformats.org/presentationml/2006/main">
+  <p:cSld>
+    <p:spTree>
+      <p:nvGrpSpPr>
+        <p:cNvPr id="1" name=""/>
+        <p:cNvGrpSpPr/>
+        <p:nvPr/>
+      </p:nvGrpSpPr>
+      <p:grpSpPr>
+        <a:xfrm>
+          <a:off x="0" y="0"/>
+          <a:ext cx="0" cy="0"/>
+          <a:chOff x="0" y="0"/>
+          <a:chExt cx="0" cy="0"/>
+        </a:xfrm>
+      </p:grpSpPr>
+      <p:sp>
+        <p:nvSpPr>
+          <p:cNvPr id="2" name="Title 1"/>
+          <p:cNvSpPr>
+            <a:spLocks noGrp="1"/>
+          </p:cNvSpPr>
+          <p:nvPr>
+            <p:ph type="title"/>
+          </p:nvPr>
+        </p:nvSpPr>
+        <p:spPr/>
+        <p:txBody>
+          <a:bodyPr/>
+          <a:lstStyle/>
+          <a:p>
+            <a:pPr lvl="0" marL="0" indent="0">
+              <a:buNone/>
+            </a:pPr>
+            <a:r>
+              <a:rPr/>
+              <a:t>R</a:t>
+            </a:r>
+            <a:r>
+              <a:rPr/>
+              <a:t> </a:t>
+            </a:r>
+            <a:r>
+              <a:rPr/>
+              <a:t>table</a:t>
+            </a:r>
+            <a:r>
+              <a:rPr/>
+              <a:t> </a:t>
+            </a:r>
+            <a:r>
+              <a:rPr/>
+              <a:t>of</a:t>
+            </a:r>
+            <a:r>
+              <a:rPr/>
+              <a:t> </a:t>
+            </a:r>
+            <a:r>
+              <a:rPr/>
+              <a:t>Weibull</a:t>
+            </a:r>
+            <a:r>
+              <a:rPr/>
+              <a:t> </a:t>
+            </a:r>
+            <a:r>
+              <a:rPr/>
+              <a:t>fit</a:t>
+            </a:r>
+          </a:p>
+        </p:txBody>
+      </p:sp>
+      <p:pic>
+        <p:nvPicPr>
+          <p:cNvPr descr="../images/weibull_table_r.png" id="0" name="Picture 1"/>
+          <p:cNvPicPr>
+            <a:picLocks noGrp="1" noChangeAspect="1"/>
+          </p:cNvPicPr>
+          <p:nvPr/>
+        </p:nvPicPr>
+        <p:blipFill>
+          <a:blip r:embed="rId2"/>
+          <a:stretch>
+            <a:fillRect/>
+          </a:stretch>
+        </p:blipFill>
+        <p:spPr bwMode="auto">
+          <a:xfrm>
+            <a:off x="774700" y="1600200"/>
+            <a:ext cx="7607300" cy="4013200"/>
+          </a:xfrm>
+          <a:prstGeom prst="rect">
+            <a:avLst/>
+          </a:prstGeom>
+          <a:noFill/>
+          <a:ln w="9525">
+            <a:noFill/>
+            <a:headEnd/>
+            <a:tailEnd/>
+          </a:ln>
+        </p:spPr>
+      </p:pic>
+      <p:sp>
+        <p:nvSpPr>
+          <p:cNvPr id="1" name="TextBox 3"/>
+          <p:cNvSpPr txBox="1"/>
+          <p:nvPr/>
+        </p:nvSpPr>
+        <p:spPr>
+          <a:xfrm>
+            <a:off x="457200" y="5613400"/>
+            <a:ext cx="8229600" cy="508000"/>
+          </a:xfrm>
+          <a:prstGeom prst="rect">
+            <a:avLst/>
+          </a:prstGeom>
+          <a:noFill/>
+        </p:spPr>
+        <p:txBody>
+          <a:bodyPr/>
+          <a:lstStyle/>
+          <a:p>
+            <a:pPr lvl="0" marL="0" indent="0" algn="ctr">
+              <a:buNone/>
+            </a:pPr>
+            <a:r>
+              <a:rPr/>
+              <a:t>Table</a:t>
+            </a:r>
+            <a:r>
+              <a:rPr/>
+              <a:t> </a:t>
+            </a:r>
+            <a:r>
+              <a:rPr/>
+              <a:t>of</a:t>
+            </a:r>
+            <a:r>
+              <a:rPr/>
+              <a:t> </a:t>
+            </a:r>
+            <a:r>
+              <a:rPr/>
+              <a:t>Weibull</a:t>
+            </a:r>
+            <a:r>
+              <a:rPr/>
+              <a:t> </a:t>
+            </a:r>
+            <a:r>
+              <a:rPr/>
+              <a:t>model</a:t>
+            </a:r>
+            <a:r>
+              <a:rPr/>
+              <a:t> </a:t>
+            </a:r>
+            <a:r>
+              <a:rPr/>
+              <a:t>fit</a:t>
+            </a:r>
+          </a:p>
+        </p:txBody>
+      </p:sp>
     </p:spTree>
   </p:cSld>
 </p:sld>

</xml_diff>

<commit_message>
Added extra SAS discussion to correction.Rmd.
</commit_message>
<xml_diff>
--- a/r/correction.pptx
+++ b/r/correction.pptx
@@ -22,6 +22,7 @@
     <p:sldId id="270" r:id="rId16"/>
     <p:sldId id="271" r:id="rId17"/>
     <p:sldId id="272" r:id="rId18"/>
+    <p:sldId id="273" r:id="rId19"/>
   </p:sldIdLst>
   <p:sldSz cx="9144000" cy="6858000" type="screen4x3"/>
   <p:notesSz cx="6858000" cy="9144000"/>
@@ -3532,7 +3533,7 @@
             </a:pPr>
             <a:r>
               <a:rPr/>
-              <a:t>The table, however, shows a value of k much larger than 1.</a:t>
+              <a:t>The table, however, shows a value of “k” much larger than 1.</a:t>
             </a:r>
           </a:p>
         </p:txBody>
@@ -4483,200 +4484,39 @@
             </a:pPr>
             <a:r>
               <a:rPr/>
-              <a:t>Conclusions</a:t>
-            </a:r>
-          </a:p>
-        </p:txBody>
-      </p:sp>
-      <p:sp>
-        <p:nvSpPr>
-          <p:cNvPr id="3" name="Content Placeholder 2"/>
-          <p:cNvSpPr>
-            <a:spLocks noGrp="1"/>
-          </p:cNvSpPr>
-          <p:nvPr>
-            <p:ph idx="1"/>
-          </p:nvPr>
-        </p:nvSpPr>
-        <p:spPr/>
-        <p:txBody>
-          <a:bodyPr/>
-          <a:lstStyle/>
-          <a:p>
-            <a:pPr lvl="0" marL="0" indent="0">
-              <a:buNone/>
-            </a:pPr>
-            <a:r>
-              <a:rPr/>
-              <a:t>There are a lot of different ways to parameterize the Weibull regression model.</a:t>
-            </a:r>
-          </a:p>
-          <a:p>
-            <a:pPr lvl="0" marL="0" indent="0">
-              <a:buNone/>
-            </a:pPr>
-            <a:r>
-              <a:rPr/>
-              <a:t>My mistake was not to RTFM. See pages 80-81 in Paul Allison’s book or section 8.3 of Hosmer, Lemeshow, and May for more details.</a:t>
-            </a:r>
-          </a:p>
-        </p:txBody>
-      </p:sp>
-    </p:spTree>
-  </p:cSld>
-</p:sld>
-</file>
-
-<file path=ppt/slides/slide2.xml><?xml version="1.0" encoding="utf-8"?>
-<p:sld xmlns:a="http://schemas.openxmlformats.org/drawingml/2006/main" xmlns:r="http://schemas.openxmlformats.org/officeDocument/2006/relationships" xmlns:p="http://schemas.openxmlformats.org/presentationml/2006/main">
-  <p:cSld>
-    <p:spTree>
-      <p:nvGrpSpPr>
-        <p:cNvPr id="1" name=""/>
-        <p:cNvGrpSpPr/>
-        <p:nvPr/>
-      </p:nvGrpSpPr>
-      <p:grpSpPr>
-        <a:xfrm>
-          <a:off x="0" y="0"/>
-          <a:ext cx="0" cy="0"/>
-          <a:chOff x="0" y="0"/>
-          <a:chExt cx="0" cy="0"/>
-        </a:xfrm>
-      </p:grpSpPr>
-      <p:sp>
-        <p:nvSpPr>
-          <p:cNvPr id="2" name="Title 1"/>
-          <p:cNvSpPr>
-            <a:spLocks noGrp="1"/>
-          </p:cNvSpPr>
-          <p:nvPr>
-            <p:ph type="title"/>
-          </p:nvPr>
-        </p:nvSpPr>
-        <p:spPr/>
-        <p:txBody>
-          <a:bodyPr/>
-          <a:lstStyle/>
-          <a:p>
-            <a:pPr lvl="0" marL="0" indent="0">
-              <a:buNone/>
-            </a:pPr>
-            <a:r>
-              <a:rPr/>
-              <a:t>Correction</a:t>
-            </a:r>
-          </a:p>
-        </p:txBody>
-      </p:sp>
-      <p:sp>
-        <p:nvSpPr>
-          <p:cNvPr id="3" name="Content Placeholder 2"/>
-          <p:cNvSpPr>
-            <a:spLocks noGrp="1"/>
-          </p:cNvSpPr>
-          <p:nvPr>
-            <p:ph idx="1"/>
-          </p:nvPr>
-        </p:nvSpPr>
-        <p:spPr/>
-        <p:txBody>
-          <a:bodyPr/>
-          <a:lstStyle/>
-          <a:p>
-            <a:pPr lvl="0" marL="0" indent="0">
-              <a:buNone/>
-            </a:pPr>
-            <a:r>
-              <a:rPr/>
-              <a:t>There is more than a little inconsistency in how distributions like the exponential and Weibull distributions are presented. I may have made some mistakes in how I presented the results from a Weibull regression model. This presentation is an attempt to fix things up.</a:t>
-            </a:r>
-          </a:p>
-        </p:txBody>
-      </p:sp>
-    </p:spTree>
-  </p:cSld>
-</p:sld>
-</file>
-
-<file path=ppt/slides/slide3.xml><?xml version="1.0" encoding="utf-8"?>
-<p:sld xmlns:a="http://schemas.openxmlformats.org/drawingml/2006/main" xmlns:r="http://schemas.openxmlformats.org/officeDocument/2006/relationships" xmlns:p="http://schemas.openxmlformats.org/presentationml/2006/main">
-  <p:cSld>
-    <p:spTree>
-      <p:nvGrpSpPr>
-        <p:cNvPr id="1" name=""/>
-        <p:cNvGrpSpPr/>
-        <p:nvPr/>
-      </p:nvGrpSpPr>
-      <p:grpSpPr>
-        <a:xfrm>
-          <a:off x="0" y="0"/>
-          <a:ext cx="0" cy="0"/>
-          <a:chOff x="0" y="0"/>
-          <a:chExt cx="0" cy="0"/>
-        </a:xfrm>
-      </p:grpSpPr>
-      <p:sp>
-        <p:nvSpPr>
-          <p:cNvPr id="2" name="Title 1"/>
-          <p:cNvSpPr>
-            <a:spLocks noGrp="1"/>
-          </p:cNvSpPr>
-          <p:nvPr>
-            <p:ph type="title"/>
-          </p:nvPr>
-        </p:nvSpPr>
-        <p:spPr/>
-        <p:txBody>
-          <a:bodyPr/>
-          <a:lstStyle/>
-          <a:p>
-            <a:pPr lvl="0" marL="0" indent="0">
-              <a:buNone/>
-            </a:pPr>
-            <a:r>
-              <a:rPr/>
-              <a:t>How</a:t>
-            </a:r>
-            <a:r>
-              <a:rPr/>
-              <a:t> </a:t>
-            </a:r>
-            <a:r>
-              <a:rPr/>
-              <a:t>I</a:t>
-            </a:r>
-            <a:r>
-              <a:rPr/>
-              <a:t> </a:t>
-            </a:r>
-            <a:r>
-              <a:rPr/>
-              <a:t>presented</a:t>
-            </a:r>
-            <a:r>
-              <a:rPr/>
-              <a:t> </a:t>
-            </a:r>
-            <a:r>
-              <a:rPr/>
-              <a:t>the</a:t>
-            </a:r>
-            <a:r>
-              <a:rPr/>
-              <a:t> </a:t>
-            </a:r>
-            <a:r>
-              <a:rPr/>
-              <a:t>Weibull</a:t>
-            </a:r>
-            <a:r>
-              <a:rPr/>
-              <a:t> </a:t>
-            </a:r>
-            <a:r>
-              <a:rPr/>
-              <a:t>distribution</a:t>
+              <a:t>The</a:t>
+            </a:r>
+            <a:r>
+              <a:rPr/>
+              <a:t> </a:t>
+            </a:r>
+            <a:r>
+              <a:rPr/>
+              <a:t>two</a:t>
+            </a:r>
+            <a:r>
+              <a:rPr/>
+              <a:t> </a:t>
+            </a:r>
+            <a:r>
+              <a:rPr/>
+              <a:t>extra</a:t>
+            </a:r>
+            <a:r>
+              <a:rPr/>
+              <a:t> </a:t>
+            </a:r>
+            <a:r>
+              <a:rPr/>
+              <a:t>SAS</a:t>
+            </a:r>
+            <a:r>
+              <a:rPr/>
+              <a:t> </a:t>
+            </a:r>
+            <a:r>
+              <a:rPr/>
+              <a:t>parameters</a:t>
             </a:r>
           </a:p>
         </p:txBody>
@@ -4703,7 +4543,7 @@
                 </a:pPr>
                 <a:r>
                   <a:rPr/>
-                  <a:t>The Weibull density and survival function</a:t>
+                  <a:t>If you use the “traditional” form of the Weibull distribution</a:t>
                 </a:r>
               </a:p>
               <a:p>
@@ -4901,8 +4741,502 @@
                 </a:pPr>
                 <a:r>
                   <a:rPr/>
-                  <a:t>In most settings, k called the shape parameter and theta is called the scale parameter.</a:t>
+                  <a:t>then SAS is telling you that</a:t>
                 </a:r>
+              </a:p>
+              <a:p>
+                <a:pPr lvl="0" marL="0" indent="0">
+                  <a:buNone/>
+                </a:pPr>
+                <a14:m>
+                  <m:oMath xmlns:m="http://schemas.openxmlformats.org/officeDocument/2006/math">
+                    <m:r>
+                      <m:t>θ</m:t>
+                    </m:r>
+                    <m:r>
+                      <m:t>=</m:t>
+                    </m:r>
+                    <m:r>
+                      <m:t>9.6566</m:t>
+                    </m:r>
+                  </m:oMath>
+                </a14:m>
+              </a:p>
+              <a:p>
+                <a:pPr lvl="0" marL="0" indent="0">
+                  <a:buNone/>
+                </a:pPr>
+                <a14:m>
+                  <m:oMath xmlns:m="http://schemas.openxmlformats.org/officeDocument/2006/math">
+                    <m:r>
+                      <m:t>k</m:t>
+                    </m:r>
+                    <m:r>
+                      <m:t>=</m:t>
+                    </m:r>
+                    <m:r>
+                      <m:t>0.7323</m:t>
+                    </m:r>
+                  </m:oMath>
+                </a14:m>
+              </a:p>
+            </p:txBody>
+          </p:sp>
+        </mc:Choice>
+      </mc:AlternateContent>
+    </p:spTree>
+  </p:cSld>
+</p:sld>
+</file>
+
+<file path=ppt/slides/slide18.xml><?xml version="1.0" encoding="utf-8"?>
+<p:sld xmlns:a="http://schemas.openxmlformats.org/drawingml/2006/main" xmlns:r="http://schemas.openxmlformats.org/officeDocument/2006/relationships" xmlns:p="http://schemas.openxmlformats.org/presentationml/2006/main">
+  <p:cSld>
+    <p:spTree>
+      <p:nvGrpSpPr>
+        <p:cNvPr id="1" name=""/>
+        <p:cNvGrpSpPr/>
+        <p:nvPr/>
+      </p:nvGrpSpPr>
+      <p:grpSpPr>
+        <a:xfrm>
+          <a:off x="0" y="0"/>
+          <a:ext cx="0" cy="0"/>
+          <a:chOff x="0" y="0"/>
+          <a:chExt cx="0" cy="0"/>
+        </a:xfrm>
+      </p:grpSpPr>
+      <p:sp>
+        <p:nvSpPr>
+          <p:cNvPr id="2" name="Title 1"/>
+          <p:cNvSpPr>
+            <a:spLocks noGrp="1"/>
+          </p:cNvSpPr>
+          <p:nvPr>
+            <p:ph type="title"/>
+          </p:nvPr>
+        </p:nvSpPr>
+        <p:spPr/>
+        <p:txBody>
+          <a:bodyPr/>
+          <a:lstStyle/>
+          <a:p>
+            <a:pPr lvl="0" marL="0" indent="0">
+              <a:buNone/>
+            </a:pPr>
+            <a:r>
+              <a:rPr/>
+              <a:t>Conclusions</a:t>
+            </a:r>
+          </a:p>
+        </p:txBody>
+      </p:sp>
+      <p:sp>
+        <p:nvSpPr>
+          <p:cNvPr id="3" name="Content Placeholder 2"/>
+          <p:cNvSpPr>
+            <a:spLocks noGrp="1"/>
+          </p:cNvSpPr>
+          <p:nvPr>
+            <p:ph idx="1"/>
+          </p:nvPr>
+        </p:nvSpPr>
+        <p:spPr/>
+        <p:txBody>
+          <a:bodyPr/>
+          <a:lstStyle/>
+          <a:p>
+            <a:pPr lvl="0" marL="0" indent="0">
+              <a:buNone/>
+            </a:pPr>
+            <a:r>
+              <a:rPr/>
+              <a:t>There are a lot of different ways to parameterize the Weibull regression model.</a:t>
+            </a:r>
+          </a:p>
+          <a:p>
+            <a:pPr lvl="0" marL="0" indent="0">
+              <a:buNone/>
+            </a:pPr>
+            <a:r>
+              <a:rPr/>
+              <a:t>My mistake was not to RTFM. See pages 80-81 in Paul Allison’s book or section 8.3 of Hosmer, Lemeshow, and May for more details.</a:t>
+            </a:r>
+          </a:p>
+        </p:txBody>
+      </p:sp>
+    </p:spTree>
+  </p:cSld>
+</p:sld>
+</file>
+
+<file path=ppt/slides/slide2.xml><?xml version="1.0" encoding="utf-8"?>
+<p:sld xmlns:a="http://schemas.openxmlformats.org/drawingml/2006/main" xmlns:r="http://schemas.openxmlformats.org/officeDocument/2006/relationships" xmlns:p="http://schemas.openxmlformats.org/presentationml/2006/main">
+  <p:cSld>
+    <p:spTree>
+      <p:nvGrpSpPr>
+        <p:cNvPr id="1" name=""/>
+        <p:cNvGrpSpPr/>
+        <p:nvPr/>
+      </p:nvGrpSpPr>
+      <p:grpSpPr>
+        <a:xfrm>
+          <a:off x="0" y="0"/>
+          <a:ext cx="0" cy="0"/>
+          <a:chOff x="0" y="0"/>
+          <a:chExt cx="0" cy="0"/>
+        </a:xfrm>
+      </p:grpSpPr>
+      <p:sp>
+        <p:nvSpPr>
+          <p:cNvPr id="2" name="Title 1"/>
+          <p:cNvSpPr>
+            <a:spLocks noGrp="1"/>
+          </p:cNvSpPr>
+          <p:nvPr>
+            <p:ph type="title"/>
+          </p:nvPr>
+        </p:nvSpPr>
+        <p:spPr/>
+        <p:txBody>
+          <a:bodyPr/>
+          <a:lstStyle/>
+          <a:p>
+            <a:pPr lvl="0" marL="0" indent="0">
+              <a:buNone/>
+            </a:pPr>
+            <a:r>
+              <a:rPr/>
+              <a:t>Correction</a:t>
+            </a:r>
+          </a:p>
+        </p:txBody>
+      </p:sp>
+      <p:sp>
+        <p:nvSpPr>
+          <p:cNvPr id="3" name="Content Placeholder 2"/>
+          <p:cNvSpPr>
+            <a:spLocks noGrp="1"/>
+          </p:cNvSpPr>
+          <p:nvPr>
+            <p:ph idx="1"/>
+          </p:nvPr>
+        </p:nvSpPr>
+        <p:spPr/>
+        <p:txBody>
+          <a:bodyPr/>
+          <a:lstStyle/>
+          <a:p>
+            <a:pPr lvl="0" marL="0" indent="0">
+              <a:buNone/>
+            </a:pPr>
+            <a:r>
+              <a:rPr/>
+              <a:t>There is more than a little inconsistency in how distributions like the exponential and Weibull distributions are presented. I may have made some mistakes in how I presented the results from a Weibull regression model. This presentation is an attempt to fix things up.</a:t>
+            </a:r>
+          </a:p>
+        </p:txBody>
+      </p:sp>
+    </p:spTree>
+  </p:cSld>
+</p:sld>
+</file>
+
+<file path=ppt/slides/slide3.xml><?xml version="1.0" encoding="utf-8"?>
+<p:sld xmlns:a="http://schemas.openxmlformats.org/drawingml/2006/main" xmlns:r="http://schemas.openxmlformats.org/officeDocument/2006/relationships" xmlns:p="http://schemas.openxmlformats.org/presentationml/2006/main">
+  <p:cSld>
+    <p:spTree>
+      <p:nvGrpSpPr>
+        <p:cNvPr id="1" name=""/>
+        <p:cNvGrpSpPr/>
+        <p:nvPr/>
+      </p:nvGrpSpPr>
+      <p:grpSpPr>
+        <a:xfrm>
+          <a:off x="0" y="0"/>
+          <a:ext cx="0" cy="0"/>
+          <a:chOff x="0" y="0"/>
+          <a:chExt cx="0" cy="0"/>
+        </a:xfrm>
+      </p:grpSpPr>
+      <p:sp>
+        <p:nvSpPr>
+          <p:cNvPr id="2" name="Title 1"/>
+          <p:cNvSpPr>
+            <a:spLocks noGrp="1"/>
+          </p:cNvSpPr>
+          <p:nvPr>
+            <p:ph type="title"/>
+          </p:nvPr>
+        </p:nvSpPr>
+        <p:spPr/>
+        <p:txBody>
+          <a:bodyPr/>
+          <a:lstStyle/>
+          <a:p>
+            <a:pPr lvl="0" marL="0" indent="0">
+              <a:buNone/>
+            </a:pPr>
+            <a:r>
+              <a:rPr/>
+              <a:t>How</a:t>
+            </a:r>
+            <a:r>
+              <a:rPr/>
+              <a:t> </a:t>
+            </a:r>
+            <a:r>
+              <a:rPr/>
+              <a:t>I</a:t>
+            </a:r>
+            <a:r>
+              <a:rPr/>
+              <a:t> </a:t>
+            </a:r>
+            <a:r>
+              <a:rPr/>
+              <a:t>presented</a:t>
+            </a:r>
+            <a:r>
+              <a:rPr/>
+              <a:t> </a:t>
+            </a:r>
+            <a:r>
+              <a:rPr/>
+              <a:t>the</a:t>
+            </a:r>
+            <a:r>
+              <a:rPr/>
+              <a:t> </a:t>
+            </a:r>
+            <a:r>
+              <a:rPr/>
+              <a:t>Weibull</a:t>
+            </a:r>
+            <a:r>
+              <a:rPr/>
+              <a:t> </a:t>
+            </a:r>
+            <a:r>
+              <a:rPr/>
+              <a:t>distribution</a:t>
+            </a:r>
+          </a:p>
+        </p:txBody>
+      </p:sp>
+      <mc:AlternateContent xmlns:mc="http://schemas.openxmlformats.org/markup-compatibility/2006">
+        <mc:Choice xmlns:a14="http://schemas.microsoft.com/office/drawing/2010/main" Requires="a14">
+          <p:sp>
+            <p:nvSpPr>
+              <p:cNvPr id="3" name="Content Placeholder 2"/>
+              <p:cNvSpPr>
+                <a:spLocks noGrp="1"/>
+              </p:cNvSpPr>
+              <p:nvPr>
+                <p:ph idx="1"/>
+              </p:nvPr>
+            </p:nvSpPr>
+            <p:spPr/>
+            <p:txBody>
+              <a:bodyPr/>
+              <a:lstStyle/>
+              <a:p>
+                <a:pPr lvl="0" marL="0" indent="0">
+                  <a:buNone/>
+                </a:pPr>
+                <a:r>
+                  <a:rPr/>
+                  <a:t>The Weibull density and survival function</a:t>
+                </a:r>
+              </a:p>
+              <a:p>
+                <a:pPr lvl="0" marL="0" indent="0">
+                  <a:buNone/>
+                </a:pPr>
+                <a14:m>
+                  <m:oMath xmlns:m="http://schemas.openxmlformats.org/officeDocument/2006/math">
+                    <m:r>
+                      <m:t>f</m:t>
+                    </m:r>
+                    <m:r>
+                      <m:t>(</m:t>
+                    </m:r>
+                    <m:r>
+                      <m:t>t</m:t>
+                    </m:r>
+                    <m:r>
+                      <m:t>,</m:t>
+                    </m:r>
+                    <m:r>
+                      <m:t>k</m:t>
+                    </m:r>
+                    <m:r>
+                      <m:t>,</m:t>
+                    </m:r>
+                    <m:r>
+                      <m:t>θ</m:t>
+                    </m:r>
+                    <m:r>
+                      <m:t>)</m:t>
+                    </m:r>
+                    <m:r>
+                      <m:t>=</m:t>
+                    </m:r>
+                    <m:f>
+                      <m:fPr>
+                        <m:type m:val="bar"/>
+                      </m:fPr>
+                      <m:num>
+                        <m:r>
+                          <m:t>k</m:t>
+                        </m:r>
+                      </m:num>
+                      <m:den>
+                        <m:r>
+                          <m:t>θ</m:t>
+                        </m:r>
+                      </m:den>
+                    </m:f>
+                    <m:r>
+                      <m:t>(</m:t>
+                    </m:r>
+                    <m:f>
+                      <m:fPr>
+                        <m:type m:val="bar"/>
+                      </m:fPr>
+                      <m:num>
+                        <m:r>
+                          <m:t>t</m:t>
+                        </m:r>
+                      </m:num>
+                      <m:den>
+                        <m:r>
+                          <m:t>θ</m:t>
+                        </m:r>
+                      </m:den>
+                    </m:f>
+                    <m:sSup>
+                      <m:e>
+                        <m:r>
+                          <m:t>)</m:t>
+                        </m:r>
+                      </m:e>
+                      <m:sup>
+                        <m:r>
+                          <m:t>k</m:t>
+                        </m:r>
+                        <m:r>
+                          <m:t>−</m:t>
+                        </m:r>
+                        <m:r>
+                          <m:t>1</m:t>
+                        </m:r>
+                      </m:sup>
+                    </m:sSup>
+                    <m:sSup>
+                      <m:e>
+                        <m:r>
+                          <m:t>e</m:t>
+                        </m:r>
+                      </m:e>
+                      <m:sup>
+                        <m:r>
+                          <m:t>−</m:t>
+                        </m:r>
+                        <m:sSup>
+                          <m:e>
+                            <m:r>
+                              <m:t>t</m:t>
+                            </m:r>
+                          </m:e>
+                          <m:sup>
+                            <m:r>
+                              <m:t>k</m:t>
+                            </m:r>
+                          </m:sup>
+                        </m:sSup>
+                      </m:sup>
+                    </m:sSup>
+                  </m:oMath>
+                </a14:m>
+              </a:p>
+              <a:p>
+                <a:pPr lvl="0" marL="0" indent="0">
+                  <a:buNone/>
+                </a:pPr>
+                <a14:m>
+                  <m:oMath xmlns:m="http://schemas.openxmlformats.org/officeDocument/2006/math">
+                    <m:r>
+                      <m:t>S</m:t>
+                    </m:r>
+                    <m:r>
+                      <m:t>(</m:t>
+                    </m:r>
+                    <m:r>
+                      <m:t>t</m:t>
+                    </m:r>
+                    <m:r>
+                      <m:t>,</m:t>
+                    </m:r>
+                    <m:r>
+                      <m:t>k</m:t>
+                    </m:r>
+                    <m:r>
+                      <m:t>,</m:t>
+                    </m:r>
+                    <m:r>
+                      <m:t>θ</m:t>
+                    </m:r>
+                    <m:r>
+                      <m:t>)</m:t>
+                    </m:r>
+                    <m:r>
+                      <m:t>=</m:t>
+                    </m:r>
+                    <m:sSup>
+                      <m:e>
+                        <m:r>
+                          <m:t>e</m:t>
+                        </m:r>
+                      </m:e>
+                      <m:sup>
+                        <m:r>
+                          <m:t>−</m:t>
+                        </m:r>
+                        <m:r>
+                          <m:t>(</m:t>
+                        </m:r>
+                        <m:f>
+                          <m:fPr>
+                            <m:type m:val="bar"/>
+                          </m:fPr>
+                          <m:num>
+                            <m:r>
+                              <m:t>t</m:t>
+                            </m:r>
+                          </m:num>
+                          <m:den>
+                            <m:r>
+                              <m:t>θ</m:t>
+                            </m:r>
+                          </m:den>
+                        </m:f>
+                        <m:sSup>
+                          <m:e>
+                            <m:r>
+                              <m:t>)</m:t>
+                            </m:r>
+                          </m:e>
+                          <m:sup>
+                            <m:r>
+                              <m:t>k</m:t>
+                            </m:r>
+                          </m:sup>
+                        </m:sSup>
+                      </m:sup>
+                    </m:sSup>
+                  </m:oMath>
+                </a14:m>
               </a:p>
               <a:p>
                 <a:pPr lvl="0" marL="0" indent="0">
@@ -4910,7 +5244,18 @@
                 </a:pPr>
                 <a:r>
                   <a:rPr/>
-                  <a:t>In an accelerated time model, I mistakenly said that k is labeled as the scale parameter. That was close, but not quite accurate.</a:t>
+                  <a:t>In most settings, k called the shape parameter and </a:t>
+                </a:r>
+                <a14:m>
+                  <m:oMath xmlns:m="http://schemas.openxmlformats.org/officeDocument/2006/math">
+                    <m:r>
+                      <m:t>θ</m:t>
+                    </m:r>
+                  </m:oMath>
+                </a14:m>
+                <a:r>
+                  <a:rPr/>
+                  <a:t> is called the scale parameter. In an accelerated time model, the term “scale parameter” is used differently, and I was careless in how I described this change.</a:t>
                 </a:r>
               </a:p>
             </p:txBody>
@@ -4959,47 +5304,23 @@
             </a:pPr>
             <a:r>
               <a:rPr/>
-              <a:t>Relationship</a:t>
-            </a:r>
-            <a:r>
-              <a:rPr/>
-              <a:t> </a:t>
-            </a:r>
-            <a:r>
-              <a:rPr/>
-              <a:t>between</a:t>
-            </a:r>
-            <a:r>
-              <a:rPr/>
-              <a:t> </a:t>
-            </a:r>
-            <a:r>
-              <a:rPr/>
-              <a:t>k</a:t>
-            </a:r>
-            <a:r>
-              <a:rPr/>
-              <a:t> </a:t>
-            </a:r>
-            <a:r>
-              <a:rPr/>
-              <a:t>and</a:t>
-            </a:r>
-            <a:r>
-              <a:rPr/>
-              <a:t> </a:t>
-            </a:r>
-            <a:r>
-              <a:rPr/>
-              <a:t>hazard</a:t>
-            </a:r>
-            <a:r>
-              <a:rPr/>
-              <a:t> </a:t>
-            </a:r>
-            <a:r>
-              <a:rPr/>
-              <a:t>for</a:t>
+              <a:t>How</a:t>
+            </a:r>
+            <a:r>
+              <a:rPr/>
+              <a:t> </a:t>
+            </a:r>
+            <a:r>
+              <a:rPr/>
+              <a:t>Wikipedia</a:t>
+            </a:r>
+            <a:r>
+              <a:rPr/>
+              <a:t> </a:t>
+            </a:r>
+            <a:r>
+              <a:rPr/>
+              <a:t>presents</a:t>
             </a:r>
             <a:r>
               <a:rPr/>
@@ -5028,39 +5349,86 @@
           </a:p>
         </p:txBody>
       </p:sp>
-      <p:sp>
-        <p:nvSpPr>
-          <p:cNvPr id="3" name="Content Placeholder 2"/>
-          <p:cNvSpPr>
-            <a:spLocks noGrp="1"/>
-          </p:cNvSpPr>
-          <p:nvPr>
-            <p:ph idx="1"/>
-          </p:nvPr>
-        </p:nvSpPr>
-        <p:spPr/>
-        <p:txBody>
-          <a:bodyPr/>
-          <a:lstStyle/>
-          <a:p>
-            <a:pPr lvl="1"/>
-            <a:r>
-              <a:rPr/>
-              <a:t>k &gt; 1, increasing hazard rate.</a:t>
-            </a:r>
-          </a:p>
-          <a:p>
-            <a:pPr lvl="1"/>
-            <a:r>
-              <a:rPr/>
-              <a:t>k &lt; 1, decreasing hazard rate.</a:t>
-            </a:r>
-          </a:p>
-          <a:p>
-            <a:pPr lvl="1"/>
-            <a:r>
-              <a:rPr/>
-              <a:t>k = 1, constant hazard rate (exponential distribution)</a:t>
+      <p:pic>
+        <p:nvPicPr>
+          <p:cNvPr descr="../images/weibull_wikipedia.png" id="0" name="Picture 1"/>
+          <p:cNvPicPr>
+            <a:picLocks noGrp="1" noChangeAspect="1"/>
+          </p:cNvPicPr>
+          <p:nvPr/>
+        </p:nvPicPr>
+        <p:blipFill>
+          <a:blip r:embed="rId2"/>
+          <a:stretch>
+            <a:fillRect/>
+          </a:stretch>
+        </p:blipFill>
+        <p:spPr bwMode="auto">
+          <a:xfrm>
+            <a:off x="457200" y="2298700"/>
+            <a:ext cx="8229600" cy="2603500"/>
+          </a:xfrm>
+          <a:prstGeom prst="rect">
+            <a:avLst/>
+          </a:prstGeom>
+          <a:noFill/>
+          <a:ln w="9525">
+            <a:noFill/>
+            <a:headEnd/>
+            <a:tailEnd/>
+          </a:ln>
+        </p:spPr>
+      </p:pic>
+      <p:sp>
+        <p:nvSpPr>
+          <p:cNvPr id="1" name="TextBox 3"/>
+          <p:cNvSpPr txBox="1"/>
+          <p:nvPr/>
+        </p:nvSpPr>
+        <p:spPr>
+          <a:xfrm>
+            <a:off x="457200" y="5613400"/>
+            <a:ext cx="8229600" cy="508000"/>
+          </a:xfrm>
+          <a:prstGeom prst="rect">
+            <a:avLst/>
+          </a:prstGeom>
+          <a:noFill/>
+        </p:spPr>
+        <p:txBody>
+          <a:bodyPr/>
+          <a:lstStyle/>
+          <a:p>
+            <a:pPr lvl="0" marL="0" indent="0" algn="ctr">
+              <a:buNone/>
+            </a:pPr>
+            <a:r>
+              <a:rPr/>
+              <a:t>Excerpt</a:t>
+            </a:r>
+            <a:r>
+              <a:rPr/>
+              <a:t> </a:t>
+            </a:r>
+            <a:r>
+              <a:rPr/>
+              <a:t>from</a:t>
+            </a:r>
+            <a:r>
+              <a:rPr/>
+              <a:t> </a:t>
+            </a:r>
+            <a:r>
+              <a:rPr/>
+              <a:t>Wikipedia</a:t>
+            </a:r>
+            <a:r>
+              <a:rPr/>
+              <a:t> </a:t>
+            </a:r>
+            <a:r>
+              <a:rPr/>
+              <a:t>page</a:t>
             </a:r>
           </a:p>
         </p:txBody>
@@ -5107,23 +5475,55 @@
             </a:pPr>
             <a:r>
               <a:rPr/>
-              <a:t>Solid</a:t>
-            </a:r>
-            <a:r>
-              <a:rPr/>
-              <a:t> </a:t>
-            </a:r>
-            <a:r>
-              <a:rPr/>
-              <a:t>line</a:t>
-            </a:r>
-            <a:r>
-              <a:rPr/>
-              <a:t> </a:t>
-            </a:r>
-            <a:r>
-              <a:rPr/>
-              <a:t>is</a:t>
+              <a:t>Relationship</a:t>
+            </a:r>
+            <a:r>
+              <a:rPr/>
+              <a:t> </a:t>
+            </a:r>
+            <a:r>
+              <a:rPr/>
+              <a:t>between</a:t>
+            </a:r>
+            <a:r>
+              <a:rPr/>
+              <a:t> </a:t>
+            </a:r>
+            <a:r>
+              <a:rPr/>
+              <a:t>k</a:t>
+            </a:r>
+            <a:r>
+              <a:rPr/>
+              <a:t> </a:t>
+            </a:r>
+            <a:r>
+              <a:rPr/>
+              <a:t>and</a:t>
+            </a:r>
+            <a:r>
+              <a:rPr/>
+              <a:t> </a:t>
+            </a:r>
+            <a:r>
+              <a:rPr/>
+              <a:t>hazard</a:t>
+            </a:r>
+            <a:r>
+              <a:rPr/>
+              <a:t> </a:t>
+            </a:r>
+            <a:r>
+              <a:rPr/>
+              <a:t>for</a:t>
+            </a:r>
+            <a:r>
+              <a:rPr/>
+              <a:t> </a:t>
+            </a:r>
+            <a:r>
+              <a:rPr/>
+              <a:t>the</a:t>
             </a:r>
             <a:r>
               <a:rPr/>
@@ -5139,49 +5539,48 @@
             </a:r>
             <a:r>
               <a:rPr/>
-              <a:t>with</a:t>
-            </a:r>
-            <a:r>
-              <a:rPr/>
-              <a:t> </a:t>
-            </a:r>
-            <a:r>
-              <a:rPr/>
-              <a:t>k=2</a:t>
-            </a:r>
-          </a:p>
-        </p:txBody>
-      </p:sp>
-      <p:pic>
-        <p:nvPicPr>
-          <p:cNvPr descr="correction_files/figure-pptx/increasing-hazard-1.png" id="0" name="Picture 1"/>
-          <p:cNvPicPr>
-            <a:picLocks noGrp="1" noChangeAspect="1"/>
-          </p:cNvPicPr>
-          <p:nvPr/>
-        </p:nvPicPr>
-        <p:blipFill>
-          <a:blip r:embed="rId2"/>
-          <a:stretch>
-            <a:fillRect/>
-          </a:stretch>
-        </p:blipFill>
-        <p:spPr bwMode="auto">
-          <a:xfrm>
-            <a:off x="508000" y="1600200"/>
-            <a:ext cx="8140700" cy="4521200"/>
-          </a:xfrm>
-          <a:prstGeom prst="rect">
-            <a:avLst/>
-          </a:prstGeom>
-          <a:noFill/>
-          <a:ln w="9525">
-            <a:noFill/>
-            <a:headEnd/>
-            <a:tailEnd/>
-          </a:ln>
-        </p:spPr>
-      </p:pic>
+              <a:t>distribution</a:t>
+            </a:r>
+          </a:p>
+        </p:txBody>
+      </p:sp>
+      <p:sp>
+        <p:nvSpPr>
+          <p:cNvPr id="3" name="Content Placeholder 2"/>
+          <p:cNvSpPr>
+            <a:spLocks noGrp="1"/>
+          </p:cNvSpPr>
+          <p:nvPr>
+            <p:ph idx="1"/>
+          </p:nvPr>
+        </p:nvSpPr>
+        <p:spPr/>
+        <p:txBody>
+          <a:bodyPr/>
+          <a:lstStyle/>
+          <a:p>
+            <a:pPr lvl="1"/>
+            <a:r>
+              <a:rPr/>
+              <a:t>k &gt; 1, increasing hazard rate.</a:t>
+            </a:r>
+          </a:p>
+          <a:p>
+            <a:pPr lvl="1"/>
+            <a:r>
+              <a:rPr/>
+              <a:t>k &lt; 1, decreasing hazard rate.</a:t>
+            </a:r>
+          </a:p>
+          <a:p>
+            <a:pPr lvl="1"/>
+            <a:r>
+              <a:rPr/>
+              <a:t>k = 1, constant hazard rate (exponential distribution)</a:t>
+            </a:r>
+          </a:p>
+        </p:txBody>
+      </p:sp>
     </p:spTree>
   </p:cSld>
 </p:sld>
@@ -5264,14 +5663,14 @@
             </a:r>
             <a:r>
               <a:rPr/>
-              <a:t>k=0.5</a:t>
+              <a:t>k=2</a:t>
             </a:r>
           </a:p>
         </p:txBody>
       </p:sp>
       <p:pic>
         <p:nvPicPr>
-          <p:cNvPr descr="correction_files/figure-pptx/decreasing-hazard-1.png" id="0" name="Picture 1"/>
+          <p:cNvPr descr="correction_files/figure-pptx/increasing-hazard-1.png" id="0" name="Picture 1"/>
           <p:cNvPicPr>
             <a:picLocks noGrp="1" noChangeAspect="1"/>
           </p:cNvPicPr>
@@ -5341,31 +5740,23 @@
             </a:pPr>
             <a:r>
               <a:rPr/>
-              <a:t>How</a:t>
-            </a:r>
-            <a:r>
-              <a:rPr/>
-              <a:t> </a:t>
-            </a:r>
-            <a:r>
-              <a:rPr/>
-              <a:t>Wikipedia</a:t>
-            </a:r>
-            <a:r>
-              <a:rPr/>
-              <a:t> </a:t>
-            </a:r>
-            <a:r>
-              <a:rPr/>
-              <a:t>presents</a:t>
-            </a:r>
-            <a:r>
-              <a:rPr/>
-              <a:t> </a:t>
-            </a:r>
-            <a:r>
-              <a:rPr/>
-              <a:t>the</a:t>
+              <a:t>Solid</a:t>
+            </a:r>
+            <a:r>
+              <a:rPr/>
+              <a:t> </a:t>
+            </a:r>
+            <a:r>
+              <a:rPr/>
+              <a:t>line</a:t>
+            </a:r>
+            <a:r>
+              <a:rPr/>
+              <a:t> </a:t>
+            </a:r>
+            <a:r>
+              <a:rPr/>
+              <a:t>is</a:t>
             </a:r>
             <a:r>
               <a:rPr/>
@@ -5381,14 +5772,22 @@
             </a:r>
             <a:r>
               <a:rPr/>
-              <a:t>distribution</a:t>
+              <a:t>with</a:t>
+            </a:r>
+            <a:r>
+              <a:rPr/>
+              <a:t> </a:t>
+            </a:r>
+            <a:r>
+              <a:rPr/>
+              <a:t>k=0.5</a:t>
             </a:r>
           </a:p>
         </p:txBody>
       </p:sp>
       <p:pic>
         <p:nvPicPr>
-          <p:cNvPr descr="../images/weibull_wikipedia.png" id="0" name="Picture 1"/>
+          <p:cNvPr descr="correction_files/figure-pptx/decreasing-hazard-1.png" id="0" name="Picture 1"/>
           <p:cNvPicPr>
             <a:picLocks noGrp="1" noChangeAspect="1"/>
           </p:cNvPicPr>
@@ -5402,8 +5801,8 @@
         </p:blipFill>
         <p:spPr bwMode="auto">
           <a:xfrm>
-            <a:off x="457200" y="2298700"/>
-            <a:ext cx="8229600" cy="2603500"/>
+            <a:off x="508000" y="1600200"/>
+            <a:ext cx="8140700" cy="4521200"/>
           </a:xfrm>
           <a:prstGeom prst="rect">
             <a:avLst/>
@@ -5416,60 +5815,6 @@
           </a:ln>
         </p:spPr>
       </p:pic>
-      <p:sp>
-        <p:nvSpPr>
-          <p:cNvPr id="1" name="TextBox 3"/>
-          <p:cNvSpPr txBox="1"/>
-          <p:nvPr/>
-        </p:nvSpPr>
-        <p:spPr>
-          <a:xfrm>
-            <a:off x="457200" y="5613400"/>
-            <a:ext cx="8229600" cy="508000"/>
-          </a:xfrm>
-          <a:prstGeom prst="rect">
-            <a:avLst/>
-          </a:prstGeom>
-          <a:noFill/>
-        </p:spPr>
-        <p:txBody>
-          <a:bodyPr/>
-          <a:lstStyle/>
-          <a:p>
-            <a:pPr lvl="0" marL="0" indent="0" algn="ctr">
-              <a:buNone/>
-            </a:pPr>
-            <a:r>
-              <a:rPr/>
-              <a:t>Excerpt</a:t>
-            </a:r>
-            <a:r>
-              <a:rPr/>
-              <a:t> </a:t>
-            </a:r>
-            <a:r>
-              <a:rPr/>
-              <a:t>from</a:t>
-            </a:r>
-            <a:r>
-              <a:rPr/>
-              <a:t> </a:t>
-            </a:r>
-            <a:r>
-              <a:rPr/>
-              <a:t>Wikipedia</a:t>
-            </a:r>
-            <a:r>
-              <a:rPr/>
-              <a:t> </a:t>
-            </a:r>
-            <a:r>
-              <a:rPr/>
-              <a:t>page</a:t>
-            </a:r>
-          </a:p>
-        </p:txBody>
-      </p:sp>
     </p:spTree>
   </p:cSld>
 </p:sld>

</xml_diff>